<commit_message>
Rmarkdown etc completed showtext understanding
</commit_message>
<xml_diff>
--- a/docs/Rmarkdown-J.pptx
+++ b/docs/Rmarkdown-J.pptx
@@ -17,6 +17,8 @@
     <p:sldId id="265" r:id="rId11"/>
     <p:sldId id="266" r:id="rId12"/>
     <p:sldId id="267" r:id="rId13"/>
+    <p:sldId id="268" r:id="rId14"/>
+    <p:sldId id="269" r:id="rId15"/>
   </p:sldIdLst>
   <p:sldSz cx="9144000" cy="5143500" type="screen16x9"/>
   <p:notesSz cx="6858000" cy="9144000"/>
@@ -3183,7 +3185,7 @@
             </a:pPr>
             <a:r>
               <a:rPr/>
-              <a:t>2023-02-14</a:t>
+              <a:t>2024-02-17</a:t>
             </a:r>
           </a:p>
         </p:txBody>
@@ -3230,7 +3232,7 @@
             </a:pPr>
             <a:r>
               <a:rPr/>
-              <a:t>いろいろな出力形式を加えたYAML</a:t>
+              <a:t>新しいコード・チャンク</a:t>
             </a:r>
           </a:p>
         </p:txBody>
@@ -3250,25 +3252,81 @@
           <a:bodyPr/>
           <a:lstStyle/>
           <a:p>
-            <a:pPr lvl="0" indent="0">
+            <a:pPr lvl="0" indent="0" marL="0">
               <a:buNone/>
             </a:pPr>
             <a:r>
-              <a:rPr>
-                <a:latin typeface="Courier"/>
-              </a:rPr>
-              <a:t>output:
-  pdf_document: 
-    latex_engine: xelatex
-  beamer_presentation: 
-    latex_engine: xelatex
-  html_document:
-    df_print: paged
-  html_notebook: default
-  word_document: 
-  powerpoint_presentation: default
-  ioslides_presentation:
-  slidy_presentation: default</a:t>
+              <a:rPr/>
+              <a:t>あらたにコード・チャンクを挿入するときは、ツール・バーの </a:t>
+            </a:r>
+            <a:r>
+              <a:rPr i="1"/>
+              <a:t>Insert Chunk</a:t>
+            </a:r>
+            <a:r>
+              <a:rPr/>
+              <a:t> ボタンを押すか、または、 </a:t>
+            </a:r>
+            <a:r>
+              <a:rPr i="1"/>
+              <a:t>Ctrl+Option+I</a:t>
+            </a:r>
+            <a:r>
+              <a:rPr/>
+              <a:t> (Win) or </a:t>
+            </a:r>
+            <a:r>
+              <a:rPr i="1"/>
+              <a:t>Cmd+Option+I</a:t>
+            </a:r>
+            <a:r>
+              <a:rPr/>
+              <a:t> (Mac) でも可能です。</a:t>
+            </a:r>
+          </a:p>
+          <a:p>
+            <a:pPr lvl="0" indent="0" marL="0">
+              <a:spcBef>
+                <a:spcPts val="3000"/>
+              </a:spcBef>
+              <a:buNone/>
+            </a:pPr>
+            <a:r>
+              <a:rPr b="1"/>
+              <a:t>まずは、Preview がおすすめ</a:t>
+            </a:r>
+          </a:p>
+          <a:p>
+            <a:pPr lvl="0" indent="0" marL="0">
+              <a:buNone/>
+            </a:pPr>
+            <a:r>
+              <a:rPr/>
+              <a:t>ノートブックを保存すると、コードを含む HTML ファイルが作成されます。プレビュー（</a:t>
+            </a:r>
+            <a:r>
+              <a:rPr i="1"/>
+              <a:t>Preview</a:t>
+            </a:r>
+            <a:r>
+              <a:rPr/>
+              <a:t> ）ボタンまたは、 </a:t>
+            </a:r>
+            <a:r>
+              <a:rPr i="1"/>
+              <a:t>Ctrl+Shift+K</a:t>
+            </a:r>
+            <a:r>
+              <a:rPr/>
+              <a:t> (Win) または </a:t>
+            </a:r>
+            <a:r>
+              <a:rPr i="1"/>
+              <a:t>Cmd+Shift+K</a:t>
+            </a:r>
+            <a:r>
+              <a:rPr/>
+              <a:t> (Mac) でも可能です。</a:t>
             </a:r>
           </a:p>
         </p:txBody>
@@ -3315,7 +3373,7 @@
             </a:pPr>
             <a:r>
               <a:rPr/>
-              <a:t>出力形式に関する備考</a:t>
+              <a:t>いろいろな出力形式を加えたYAML</a:t>
             </a:r>
           </a:p>
         </p:txBody>
@@ -3335,41 +3393,34 @@
           <a:bodyPr/>
           <a:lstStyle/>
           <a:p>
-            <a:pPr lvl="0"/>
+            <a:pPr lvl="0" indent="0">
+              <a:buNone/>
+            </a:pPr>
+            <a:r>
+              <a:rPr>
+                <a:latin typeface="Courier"/>
+              </a:rPr>
+              <a:t>output:
+  pdf_document: 
+    latex_engine: xelatex
+  beamer_presentation: 
+    latex_engine: xelatex
+  html_document:
+    df_print: paged
+  html_notebook: default
+  word_document: default
+  powerpoint_presentation: default
+  ioslides_presentation: default
+  slidy_presentation: default</a:t>
+            </a:r>
+          </a:p>
+          <a:p>
+            <a:pPr lvl="0" indent="0" marL="0">
+              <a:buNone/>
+            </a:pPr>
             <a:r>
               <a:rPr/>
-              <a:t>スライドの場合は、第二レベルの表題 ##　があると、あたらしいスライドとなります。</a:t>
-            </a:r>
-          </a:p>
-          <a:p>
-            <a:pPr lvl="0"/>
-            <a:r>
-              <a:rPr>
-                <a:latin typeface="Courier"/>
-              </a:rPr>
-              <a:t>---</a:t>
-            </a:r>
-            <a:r>
-              <a:rPr/>
-              <a:t> または、Visual エディターの、Horizontal Line でも新しいスライドになります。</a:t>
-            </a:r>
-          </a:p>
-          <a:p>
-            <a:pPr lvl="0"/>
-            <a:r>
-              <a:rPr/>
-              <a:t>Word や PowerPoint は、書式ファイルを付けることが可能です。参考文献を参照してください。</a:t>
-            </a:r>
-          </a:p>
-          <a:p>
-            <a:pPr lvl="0"/>
-            <a:r>
-              <a:rPr i="1"/>
-              <a:t>Knit</a:t>
-            </a:r>
-            <a:r>
-              <a:rPr/>
-              <a:t> ボタンの隣のギアマーク の Output Option からそれぞれの書式を変更することが可能です。</a:t>
+              <a:t>Knit ボタンから、他の形式を選び、試してみてください。</a:t>
             </a:r>
           </a:p>
         </p:txBody>
@@ -3416,6 +3467,234 @@
             </a:pPr>
             <a:r>
               <a:rPr/>
+              <a:t>出力形式に関する備考</a:t>
+            </a:r>
+          </a:p>
+        </p:txBody>
+      </p:sp>
+      <p:sp>
+        <p:nvSpPr>
+          <p:cNvPr id="3" name="Content Placeholder 2"/>
+          <p:cNvSpPr>
+            <a:spLocks noGrp="1"/>
+          </p:cNvSpPr>
+          <p:nvPr>
+            <p:ph idx="1"/>
+          </p:nvPr>
+        </p:nvSpPr>
+        <p:spPr/>
+        <p:txBody>
+          <a:bodyPr/>
+          <a:lstStyle/>
+          <a:p>
+            <a:pPr lvl="0"/>
+            <a:r>
+              <a:rPr/>
+              <a:t>スライドの場合は、第二レベルの表題 ##　があると、改ページとなります。</a:t>
+            </a:r>
+          </a:p>
+          <a:p>
+            <a:pPr lvl="0"/>
+            <a:r>
+              <a:rPr>
+                <a:latin typeface="Courier"/>
+              </a:rPr>
+              <a:t>---</a:t>
+            </a:r>
+            <a:r>
+              <a:rPr/>
+              <a:t> または、Visual エディターの、Horizontal Line でも、改ページになります。</a:t>
+            </a:r>
+          </a:p>
+          <a:p>
+            <a:pPr lvl="0"/>
+            <a:r>
+              <a:rPr/>
+              <a:t>Word や PowerPoint は、一度、Knit して出力したファイルの書式を変更して、“my-styles.docx”、“my-styles.pptx” などと名称を変更して、下のように、書式ファイルを付けることが可能です。参考文献を参照してください。</a:t>
+            </a:r>
+          </a:p>
+          <a:p>
+            <a:pPr lvl="0" indent="0">
+              <a:buNone/>
+            </a:pPr>
+            <a:r>
+              <a:rPr>
+                <a:latin typeface="Courier"/>
+              </a:rPr>
+              <a:t>---
+ word_document:
+    reference_docx: my-styles.docx
+ powerpoint_presentation:
+    reference_doc: my-styles.pptx
+---</a:t>
+            </a:r>
+          </a:p>
+          <a:p>
+            <a:pPr lvl="0"/>
+            <a:r>
+              <a:rPr/>
+              <a:t>PDF 作成には、</a:t>
+            </a:r>
+            <a:r>
+              <a:rPr>
+                <a:latin typeface="Courier"/>
+              </a:rPr>
+              <a:t>tinytex</a:t>
+            </a:r>
+            <a:r>
+              <a:rPr/>
+              <a:t> パッケージのインストールが必要。その後、Console で </a:t>
+            </a:r>
+            <a:r>
+              <a:rPr>
+                <a:latin typeface="Courier"/>
+              </a:rPr>
+              <a:t>tinytex::install_tinytex()</a:t>
+            </a:r>
+            <a:r>
+              <a:rPr/>
+              <a:t>.</a:t>
+            </a:r>
+          </a:p>
+        </p:txBody>
+      </p:sp>
+    </p:spTree>
+  </p:cSld>
+</p:sld>
+</file>
+
+<file path=ppt/slides/slide13.xml><?xml version="1.0" encoding="utf-8"?>
+<p:sld xmlns:a="http://schemas.openxmlformats.org/drawingml/2006/main" xmlns:r="http://schemas.openxmlformats.org/officeDocument/2006/relationships" xmlns:p="http://schemas.openxmlformats.org/presentationml/2006/main">
+  <p:cSld>
+    <p:spTree>
+      <p:nvGrpSpPr>
+        <p:cNvPr id="1" name=""/>
+        <p:cNvGrpSpPr/>
+        <p:nvPr/>
+      </p:nvGrpSpPr>
+      <p:grpSpPr>
+        <a:xfrm>
+          <a:off x="0" y="0"/>
+          <a:ext cx="0" cy="0"/>
+          <a:chOff x="0" y="0"/>
+          <a:chExt cx="0" cy="0"/>
+        </a:xfrm>
+      </p:grpSpPr>
+      <p:sp>
+        <p:nvSpPr>
+          <p:cNvPr id="2" name="Title 1"/>
+          <p:cNvSpPr>
+            <a:spLocks noGrp="1"/>
+          </p:cNvSpPr>
+          <p:nvPr>
+            <p:ph type="title"/>
+          </p:nvPr>
+        </p:nvSpPr>
+        <p:spPr/>
+        <p:txBody>
+          <a:bodyPr/>
+          <a:lstStyle/>
+          <a:p>
+            <a:pPr lvl="0" indent="0" marL="0">
+              <a:buNone/>
+            </a:pPr>
+            <a:r>
+              <a:rPr/>
+              <a:t>さまざまな設定</a:t>
+            </a:r>
+          </a:p>
+        </p:txBody>
+      </p:sp>
+      <p:sp>
+        <p:nvSpPr>
+          <p:cNvPr id="3" name="Content Placeholder 2"/>
+          <p:cNvSpPr>
+            <a:spLocks noGrp="1"/>
+          </p:cNvSpPr>
+          <p:nvPr>
+            <p:ph idx="1"/>
+          </p:nvPr>
+        </p:nvSpPr>
+        <p:spPr/>
+        <p:txBody>
+          <a:bodyPr/>
+          <a:lstStyle/>
+          <a:p>
+            <a:pPr lvl="0"/>
+            <a:r>
+              <a:rPr i="1"/>
+              <a:t>Knit</a:t>
+            </a:r>
+            <a:r>
+              <a:rPr/>
+              <a:t> ボタンの隣のギアマーク の Output Option からそれぞれの書式を変更することが可能です。</a:t>
+            </a:r>
+          </a:p>
+          <a:p>
+            <a:pPr lvl="0"/>
+            <a:r>
+              <a:rPr/>
+              <a:t>節番号自動振り付け、ページ番号、テーマ、出力する図のサイズなどが、それぞれの形式に応じて選択できます。</a:t>
+            </a:r>
+          </a:p>
+          <a:p>
+            <a:pPr lvl="0"/>
+            <a:r>
+              <a:rPr/>
+              <a:t>また、コード・チャンクの右上にある、ギア・マークからも、コードを出力するか否か、実行するか否か、コード・チャンクの名称、図のサイズなどが選択できます。</a:t>
+            </a:r>
+          </a:p>
+          <a:p>
+            <a:pPr lvl="0"/>
+            <a:r>
+              <a:rPr/>
+              <a:t>{r cache=TRUE} とすると、キャッシュしてくれるので、実行に時間がかかるコード・チャンクには、このようなオプションを加えるのも良いでしょう。</a:t>
+            </a:r>
+          </a:p>
+        </p:txBody>
+      </p:sp>
+    </p:spTree>
+  </p:cSld>
+</p:sld>
+</file>
+
+<file path=ppt/slides/slide14.xml><?xml version="1.0" encoding="utf-8"?>
+<p:sld xmlns:a="http://schemas.openxmlformats.org/drawingml/2006/main" xmlns:r="http://schemas.openxmlformats.org/officeDocument/2006/relationships" xmlns:p="http://schemas.openxmlformats.org/presentationml/2006/main">
+  <p:cSld>
+    <p:spTree>
+      <p:nvGrpSpPr>
+        <p:cNvPr id="1" name=""/>
+        <p:cNvGrpSpPr/>
+        <p:nvPr/>
+      </p:nvGrpSpPr>
+      <p:grpSpPr>
+        <a:xfrm>
+          <a:off x="0" y="0"/>
+          <a:ext cx="0" cy="0"/>
+          <a:chOff x="0" y="0"/>
+          <a:chExt cx="0" cy="0"/>
+        </a:xfrm>
+      </p:grpSpPr>
+      <p:sp>
+        <p:nvSpPr>
+          <p:cNvPr id="2" name="Title 1"/>
+          <p:cNvSpPr>
+            <a:spLocks noGrp="1"/>
+          </p:cNvSpPr>
+          <p:nvPr>
+            <p:ph type="title"/>
+          </p:nvPr>
+        </p:nvSpPr>
+        <p:spPr/>
+        <p:txBody>
+          <a:bodyPr/>
+          <a:lstStyle/>
+          <a:p>
+            <a:pPr lvl="0" indent="0" marL="0">
+              <a:buNone/>
+            </a:pPr>
+            <a:r>
+              <a:rPr/>
               <a:t>参考文献 References</a:t>
             </a:r>
           </a:p>
@@ -3439,27 +3718,53 @@
             <a:pPr lvl="0"/>
             <a:r>
               <a:rPr/>
-              <a:t>Posit Primers: </a:t>
+              <a:t>一般的な解説：</a:t>
             </a:r>
             <a:r>
               <a:rPr>
                 <a:hlinkClick r:id="rId2"/>
               </a:rPr>
+              <a:t>みんなのデータサイエンス</a:t>
+            </a:r>
+            <a:r>
+              <a:rPr/>
+              <a:t>、</a:t>
+            </a:r>
+            <a:r>
+              <a:rPr>
+                <a:hlinkClick r:id="rId3"/>
+              </a:rPr>
+              <a:t>Posit Recipes</a:t>
+            </a:r>
+            <a:r>
+              <a:rPr/>
+              <a:t>:</a:t>
+            </a:r>
+          </a:p>
+          <a:p>
+            <a:pPr lvl="0"/>
+            <a:r>
+              <a:rPr>
+                <a:hlinkClick r:id="rId4"/>
+              </a:rPr>
               <a:t>Report Reproducibly</a:t>
             </a:r>
+            <a:r>
+              <a:rPr/>
+              <a:t>: R Markdown についての解説</a:t>
+            </a:r>
           </a:p>
           <a:p>
             <a:pPr lvl="0"/>
             <a:r>
+              <a:rPr>
+                <a:hlinkClick r:id="rId5"/>
+              </a:rPr>
+              <a:t>Cheat Sheet</a:t>
+            </a:r>
+            <a:r>
               <a:rPr/>
-              <a:t>Markdown Quick Reference: Top Menu Bar &gt; Help &gt; Markdown Quick Reference</a:t>
-            </a:r>
-          </a:p>
-          <a:p>
-            <a:pPr lvl="0"/>
-            <a:r>
-              <a:rPr/>
-              <a:t>Cheat Sheet (Top Menu Bar: Help &gt; Cheat Sheets): RMarkdown Cheat Sheet, RMarkdown Reference Guide</a:t>
+              <a:t> (Top Menu Bar: Help &gt; Cheat Sheets): RMarkdown Cheat Sheet, RMarkdown Reference Guide</a:t>
             </a:r>
           </a:p>
           <a:p>
@@ -3468,12 +3773,28 @@
               <a:rPr/>
               <a:t>Books:</a:t>
             </a:r>
+            <a:r>
+              <a:rPr>
+                <a:hlinkClick r:id="rId6"/>
+              </a:rPr>
+              <a:t>R for Datascience (1e)</a:t>
+            </a:r>
+            <a:r>
+              <a:rPr/>
+              <a:t>, </a:t>
+            </a:r>
+            <a:r>
+              <a:rPr>
+                <a:hlinkClick r:id="rId7"/>
+              </a:rPr>
+              <a:t>2nd Ed.</a:t>
+            </a:r>
           </a:p>
           <a:p>
             <a:pPr lvl="1"/>
             <a:r>
               <a:rPr>
-                <a:hlinkClick r:id="rId3"/>
+                <a:hlinkClick r:id="rId8"/>
               </a:rPr>
               <a:t>R Markdown: The Definitive Guide</a:t>
             </a:r>
@@ -3482,16 +3803,76 @@
             <a:pPr lvl="1"/>
             <a:r>
               <a:rPr>
-                <a:hlinkClick r:id="rId4"/>
+                <a:hlinkClick r:id="rId9"/>
               </a:rPr>
               <a:t>R Markdown Cookbook</a:t>
             </a:r>
+            <a:r>
+              <a:rPr/>
+              <a:t>・</a:t>
+            </a:r>
+            <a:r>
+              <a:rPr>
+                <a:hlinkClick r:id="rId10"/>
+              </a:rPr>
+              <a:t>日本語翻訳版</a:t>
+            </a:r>
           </a:p>
           <a:p>
             <a:pPr lvl="0"/>
             <a:r>
               <a:rPr/>
-              <a:t>Post error messages to a web search engine.</a:t>
+              <a:t>エラーが出て不明なときは、検索エンジンまたは、</a:t>
+            </a:r>
+            <a:r>
+              <a:rPr>
+                <a:hlinkClick r:id="rId11"/>
+              </a:rPr>
+              <a:t>Google Gemini</a:t>
+            </a:r>
+            <a:r>
+              <a:rPr/>
+              <a:t>, </a:t>
+            </a:r>
+            <a:r>
+              <a:rPr>
+                <a:hlinkClick r:id="rId12"/>
+              </a:rPr>
+              <a:t>Chat GPT</a:t>
+            </a:r>
+            <a:r>
+              <a:rPr/>
+              <a:t>, </a:t>
+            </a:r>
+            <a:r>
+              <a:rPr>
+                <a:hlinkClick r:id="rId13"/>
+              </a:rPr>
+              <a:t>Poe</a:t>
+            </a:r>
+            <a:r>
+              <a:rPr/>
+              <a:t> などの AI で、解決方法を探してください。このときに、Console で、</a:t>
+            </a:r>
+            <a:r>
+              <a:rPr>
+                <a:latin typeface="Courier"/>
+              </a:rPr>
+              <a:t>Sys.setenv(LANG = "en")</a:t>
+            </a:r>
+            <a:r>
+              <a:rPr/>
+              <a:t> として、英語のエラーメッセージを得ておいた方が、解決方法が見つかりやすくなります。戻す時は、</a:t>
+            </a:r>
+            <a:r>
+              <a:rPr>
+                <a:latin typeface="Courier"/>
+              </a:rPr>
+              <a:t>Sys.setenv(LANG = "ja")</a:t>
+            </a:r>
+            <a:r>
+              <a:rPr/>
+              <a:t>.</a:t>
             </a:r>
           </a:p>
         </p:txBody>
@@ -3722,7 +4103,7 @@
             </a:pPr>
             <a:r>
               <a:rPr/>
-              <a:t>Test Code Chunk (1)</a:t>
+              <a:t>日本語・中国語・韓国語</a:t>
             </a:r>
           </a:p>
         </p:txBody>
@@ -3742,23 +4123,84 @@
           <a:bodyPr/>
           <a:lstStyle/>
           <a:p>
+            <a:pPr lvl="0" indent="0" marL="0">
+              <a:buNone/>
+            </a:pPr>
+            <a:r>
+              <a:rPr/>
+              <a:t>文字化けが、起こることが多く、対応が、一定せず、難しかったのですが、現在は、どの場合も、次の設定で、解決しているようです。下の例を確認してください。</a:t>
+            </a:r>
+          </a:p>
+          <a:p>
             <a:pPr lvl="0" indent="0">
               <a:buNone/>
             </a:pPr>
             <a:r>
+              <a:rPr i="1">
+                <a:solidFill>
+                  <a:srgbClr val="60A0B0"/>
+                </a:solidFill>
+                <a:latin typeface="Courier"/>
+              </a:rPr>
+              <a:t># showtext を、インストールしていない場合は、一回だけ、右上の三角をクリックして実行</a:t>
+            </a:r>
+            <a:br/>
+            <a:r>
               <a:rPr>
                 <a:solidFill>
                   <a:srgbClr val="06287E"/>
                 </a:solidFill>
                 <a:latin typeface="Courier"/>
               </a:rPr>
-              <a:t>head</a:t>
-            </a:r>
-            <a:r>
-              <a:rPr>
-                <a:latin typeface="Courier"/>
-              </a:rPr>
-              <a:t>(cars)</a:t>
+              <a:t>install.packages</a:t>
+            </a:r>
+            <a:r>
+              <a:rPr>
+                <a:latin typeface="Courier"/>
+              </a:rPr>
+              <a:t>(</a:t>
+            </a:r>
+            <a:r>
+              <a:rPr>
+                <a:solidFill>
+                  <a:srgbClr val="4070A0"/>
+                </a:solidFill>
+                <a:latin typeface="Courier"/>
+              </a:rPr>
+              <a:t>'showtext'</a:t>
+            </a:r>
+            <a:r>
+              <a:rPr>
+                <a:latin typeface="Courier"/>
+              </a:rPr>
+              <a:t>)</a:t>
+            </a:r>
+          </a:p>
+          <a:p>
+            <a:pPr lvl="0" indent="0" marL="0">
+              <a:spcBef>
+                <a:spcPts val="3000"/>
+              </a:spcBef>
+              <a:buNone/>
+            </a:pPr>
+            <a:r>
+              <a:rPr b="1"/>
+              <a:t>パッケージをロード</a:t>
+            </a:r>
+          </a:p>
+          <a:p>
+            <a:pPr lvl="0" indent="0" marL="0">
+              <a:buNone/>
+            </a:pPr>
+            <a:r>
+              <a:rPr>
+                <a:latin typeface="Courier"/>
+              </a:rPr>
+              <a:t>library</a:t>
+            </a:r>
+            <a:r>
+              <a:rPr/>
+              <a:t> によって、Package をロード（いつでも使えるように）します。</a:t>
             </a:r>
           </a:p>
           <a:p>
@@ -3767,15 +4209,104 @@
             </a:pPr>
             <a:r>
               <a:rPr>
-                <a:latin typeface="Courier"/>
-              </a:rPr>
-              <a:t>##   speed dist
-## 1     4    2
-## 2     4   10
-## 3     7    4
-## 4     7   22
-## 5     8   16
-## 6     9   10</a:t>
+                <a:solidFill>
+                  <a:srgbClr val="06287E"/>
+                </a:solidFill>
+                <a:latin typeface="Courier"/>
+              </a:rPr>
+              <a:t>library</a:t>
+            </a:r>
+            <a:r>
+              <a:rPr>
+                <a:latin typeface="Courier"/>
+              </a:rPr>
+              <a:t>(tidyverse)</a:t>
+            </a:r>
+            <a:br/>
+            <a:r>
+              <a:rPr>
+                <a:solidFill>
+                  <a:srgbClr val="06287E"/>
+                </a:solidFill>
+                <a:latin typeface="Courier"/>
+              </a:rPr>
+              <a:t>library</a:t>
+            </a:r>
+            <a:r>
+              <a:rPr>
+                <a:latin typeface="Courier"/>
+              </a:rPr>
+              <a:t>(showtext) </a:t>
+            </a:r>
+            <a:br/>
+            <a:r>
+              <a:rPr>
+                <a:latin typeface="Courier"/>
+              </a:rPr>
+              <a:t>knitr</a:t>
+            </a:r>
+            <a:r>
+              <a:rPr>
+                <a:solidFill>
+                  <a:srgbClr val="4070A0"/>
+                </a:solidFill>
+                <a:latin typeface="Courier"/>
+              </a:rPr>
+              <a:t>::</a:t>
+            </a:r>
+            <a:r>
+              <a:rPr>
+                <a:latin typeface="Courier"/>
+              </a:rPr>
+              <a:t>opts_chunk</a:t>
+            </a:r>
+            <a:r>
+              <a:rPr>
+                <a:solidFill>
+                  <a:srgbClr val="4070A0"/>
+                </a:solidFill>
+                <a:latin typeface="Courier"/>
+              </a:rPr>
+              <a:t>$</a:t>
+            </a:r>
+            <a:r>
+              <a:rPr>
+                <a:solidFill>
+                  <a:srgbClr val="06287E"/>
+                </a:solidFill>
+                <a:latin typeface="Courier"/>
+              </a:rPr>
+              <a:t>set</a:t>
+            </a:r>
+            <a:r>
+              <a:rPr>
+                <a:latin typeface="Courier"/>
+              </a:rPr>
+              <a:t>(</a:t>
+            </a:r>
+            <a:r>
+              <a:rPr>
+                <a:solidFill>
+                  <a:srgbClr val="7D9029"/>
+                </a:solidFill>
+                <a:latin typeface="Courier"/>
+              </a:rPr>
+              <a:t>fig.showtext=</a:t>
+            </a:r>
+            <a:r>
+              <a:rPr>
+                <a:solidFill>
+                  <a:srgbClr val="880000"/>
+                </a:solidFill>
+                <a:latin typeface="Courier"/>
+              </a:rPr>
+              <a:t>TRUE</a:t>
+            </a:r>
+            <a:r>
+              <a:rPr>
+                <a:latin typeface="Courier"/>
+              </a:rPr>
+              <a:t>)</a:t>
             </a:r>
           </a:p>
         </p:txBody>
@@ -3812,6 +4343,106 @@
             <p:ph type="title"/>
           </p:nvPr>
         </p:nvSpPr>
+        <p:spPr/>
+        <p:txBody>
+          <a:bodyPr/>
+          <a:lstStyle/>
+          <a:p>
+            <a:pPr lvl="0" indent="0" marL="0">
+              <a:buNone/>
+            </a:pPr>
+            <a:r>
+              <a:rPr/>
+              <a:t>Test Code Chunk (1)</a:t>
+            </a:r>
+          </a:p>
+        </p:txBody>
+      </p:sp>
+      <p:sp>
+        <p:nvSpPr>
+          <p:cNvPr id="3" name="Content Placeholder 2"/>
+          <p:cNvSpPr>
+            <a:spLocks noGrp="1"/>
+          </p:cNvSpPr>
+          <p:nvPr>
+            <p:ph idx="1"/>
+          </p:nvPr>
+        </p:nvSpPr>
+        <p:spPr/>
+        <p:txBody>
+          <a:bodyPr/>
+          <a:lstStyle/>
+          <a:p>
+            <a:pPr lvl="0" indent="0">
+              <a:buNone/>
+            </a:pPr>
+            <a:r>
+              <a:rPr>
+                <a:solidFill>
+                  <a:srgbClr val="06287E"/>
+                </a:solidFill>
+                <a:latin typeface="Courier"/>
+              </a:rPr>
+              <a:t>head</a:t>
+            </a:r>
+            <a:r>
+              <a:rPr>
+                <a:latin typeface="Courier"/>
+              </a:rPr>
+              <a:t>(cars)</a:t>
+            </a:r>
+          </a:p>
+          <a:p>
+            <a:pPr lvl="0" indent="0">
+              <a:buNone/>
+            </a:pPr>
+            <a:r>
+              <a:rPr>
+                <a:latin typeface="Courier"/>
+              </a:rPr>
+              <a:t>##   speed dist
+## 1     4    2
+## 2     4   10
+## 3     7    4
+## 4     7   22
+## 5     8   16
+## 6     9   10</a:t>
+            </a:r>
+          </a:p>
+        </p:txBody>
+      </p:sp>
+    </p:spTree>
+  </p:cSld>
+</p:sld>
+</file>
+
+<file path=ppt/slides/slide6.xml><?xml version="1.0" encoding="utf-8"?>
+<p:sld xmlns:a="http://schemas.openxmlformats.org/drawingml/2006/main" xmlns:r="http://schemas.openxmlformats.org/officeDocument/2006/relationships" xmlns:p="http://schemas.openxmlformats.org/presentationml/2006/main">
+  <p:cSld>
+    <p:spTree>
+      <p:nvGrpSpPr>
+        <p:cNvPr id="1" name=""/>
+        <p:cNvGrpSpPr/>
+        <p:nvPr/>
+      </p:nvGrpSpPr>
+      <p:grpSpPr>
+        <a:xfrm>
+          <a:off x="0" y="0"/>
+          <a:ext cx="0" cy="0"/>
+          <a:chOff x="0" y="0"/>
+          <a:chExt cx="0" cy="0"/>
+        </a:xfrm>
+      </p:grpSpPr>
+      <p:sp>
+        <p:nvSpPr>
+          <p:cNvPr id="2" name="Title 1"/>
+          <p:cNvSpPr>
+            <a:spLocks noGrp="1"/>
+          </p:cNvSpPr>
+          <p:nvPr>
+            <p:ph type="title"/>
+          </p:nvPr>
+        </p:nvSpPr>
         <p:spPr>
           <a:xfrm>
             <a:off x="457201" y="204787"/>
@@ -3894,7 +4525,7 @@
       </p:sp>
       <p:pic>
         <p:nvPicPr>
-          <p:cNvPr descr="Rmarkdown-J_files/figure-pptx/unnamed-chunk-2-1.png" id="0" name="Picture 1"/>
+          <p:cNvPr descr="Rmarkdown-J_files/figure-pptx/unnamed-chunk-4-1.png" id="0" name="Picture 1"/>
           <p:cNvPicPr>
             <a:picLocks noGrp="1" noChangeAspect="1"/>
           </p:cNvPicPr>
@@ -3927,7 +4558,7 @@
 </p:sld>
 </file>
 
-<file path=ppt/slides/slide6.xml><?xml version="1.0" encoding="utf-8"?>
+<file path=ppt/slides/slide7.xml><?xml version="1.0" encoding="utf-8"?>
 <p:sld xmlns:a="http://schemas.openxmlformats.org/drawingml/2006/main" xmlns:r="http://schemas.openxmlformats.org/officeDocument/2006/relationships" xmlns:p="http://schemas.openxmlformats.org/presentationml/2006/main">
   <p:cSld>
     <p:spTree>
@@ -3954,12 +4585,7 @@
             <p:ph type="title"/>
           </p:nvPr>
         </p:nvSpPr>
-        <p:spPr>
-          <a:xfrm>
-            <a:off x="457201" y="204787"/>
-            <a:ext cx="3008313" cy="871538"/>
-          </a:xfrm>
-        </p:spPr>
+        <p:spPr/>
         <p:txBody>
           <a:bodyPr/>
           <a:lstStyle/>
@@ -3976,6 +4602,658 @@
       </p:sp>
       <p:sp>
         <p:nvSpPr>
+          <p:cNvPr id="3" name="Content Placeholder 2"/>
+          <p:cNvSpPr>
+            <a:spLocks noGrp="1"/>
+          </p:cNvSpPr>
+          <p:nvPr>
+            <p:ph idx="1"/>
+          </p:nvPr>
+        </p:nvSpPr>
+        <p:spPr/>
+        <p:txBody>
+          <a:bodyPr/>
+          <a:lstStyle/>
+          <a:p>
+            <a:pPr lvl="0" indent="0">
+              <a:buNone/>
+            </a:pPr>
+            <a:r>
+              <a:rPr>
+                <a:latin typeface="Courier"/>
+              </a:rPr>
+              <a:t>df_iris </a:t>
+            </a:r>
+            <a:r>
+              <a:rPr>
+                <a:solidFill>
+                  <a:srgbClr val="007020"/>
+                </a:solidFill>
+                <a:latin typeface="Courier"/>
+              </a:rPr>
+              <a:t>&lt;-</a:t>
+            </a:r>
+            <a:r>
+              <a:rPr>
+                <a:latin typeface="Courier"/>
+              </a:rPr>
+              <a:t> iris</a:t>
+            </a:r>
+            <a:br/>
+            <a:r>
+              <a:rPr>
+                <a:solidFill>
+                  <a:srgbClr val="06287E"/>
+                </a:solidFill>
+                <a:latin typeface="Courier"/>
+              </a:rPr>
+              <a:t>colnames</a:t>
+            </a:r>
+            <a:r>
+              <a:rPr>
+                <a:latin typeface="Courier"/>
+              </a:rPr>
+              <a:t>(df_iris) </a:t>
+            </a:r>
+            <a:r>
+              <a:rPr>
+                <a:solidFill>
+                  <a:srgbClr val="007020"/>
+                </a:solidFill>
+                <a:latin typeface="Courier"/>
+              </a:rPr>
+              <a:t>&lt;-</a:t>
+            </a:r>
+            <a:r>
+              <a:rPr>
+                <a:latin typeface="Courier"/>
+              </a:rPr>
+              <a:t> </a:t>
+            </a:r>
+            <a:r>
+              <a:rPr>
+                <a:solidFill>
+                  <a:srgbClr val="06287E"/>
+                </a:solidFill>
+                <a:latin typeface="Courier"/>
+              </a:rPr>
+              <a:t>c</a:t>
+            </a:r>
+            <a:r>
+              <a:rPr>
+                <a:latin typeface="Courier"/>
+              </a:rPr>
+              <a:t>(</a:t>
+            </a:r>
+            <a:r>
+              <a:rPr>
+                <a:solidFill>
+                  <a:srgbClr val="4070A0"/>
+                </a:solidFill>
+                <a:latin typeface="Courier"/>
+              </a:rPr>
+              <a:t>"萼長"</a:t>
+            </a:r>
+            <a:r>
+              <a:rPr>
+                <a:latin typeface="Courier"/>
+              </a:rPr>
+              <a:t>,</a:t>
+            </a:r>
+            <a:r>
+              <a:rPr>
+                <a:solidFill>
+                  <a:srgbClr val="4070A0"/>
+                </a:solidFill>
+                <a:latin typeface="Courier"/>
+              </a:rPr>
+              <a:t>"萼幅"</a:t>
+            </a:r>
+            <a:r>
+              <a:rPr>
+                <a:latin typeface="Courier"/>
+              </a:rPr>
+              <a:t>,</a:t>
+            </a:r>
+            <a:r>
+              <a:rPr>
+                <a:solidFill>
+                  <a:srgbClr val="4070A0"/>
+                </a:solidFill>
+                <a:latin typeface="Courier"/>
+              </a:rPr>
+              <a:t>"葉長"</a:t>
+            </a:r>
+            <a:r>
+              <a:rPr>
+                <a:latin typeface="Courier"/>
+              </a:rPr>
+              <a:t>,</a:t>
+            </a:r>
+            <a:r>
+              <a:rPr>
+                <a:solidFill>
+                  <a:srgbClr val="4070A0"/>
+                </a:solidFill>
+                <a:latin typeface="Courier"/>
+              </a:rPr>
+              <a:t>"葉幅"</a:t>
+            </a:r>
+            <a:r>
+              <a:rPr>
+                <a:latin typeface="Courier"/>
+              </a:rPr>
+              <a:t>,</a:t>
+            </a:r>
+            <a:r>
+              <a:rPr>
+                <a:solidFill>
+                  <a:srgbClr val="4070A0"/>
+                </a:solidFill>
+                <a:latin typeface="Courier"/>
+              </a:rPr>
+              <a:t>"Species"</a:t>
+            </a:r>
+            <a:r>
+              <a:rPr>
+                <a:latin typeface="Courier"/>
+              </a:rPr>
+              <a:t> )</a:t>
+            </a:r>
+            <a:br/>
+            <a:r>
+              <a:rPr>
+                <a:latin typeface="Courier"/>
+              </a:rPr>
+              <a:t>tab </a:t>
+            </a:r>
+            <a:r>
+              <a:rPr>
+                <a:solidFill>
+                  <a:srgbClr val="007020"/>
+                </a:solidFill>
+                <a:latin typeface="Courier"/>
+              </a:rPr>
+              <a:t>&lt;-</a:t>
+            </a:r>
+            <a:r>
+              <a:rPr>
+                <a:latin typeface="Courier"/>
+              </a:rPr>
+              <a:t> </a:t>
+            </a:r>
+            <a:r>
+              <a:rPr>
+                <a:solidFill>
+                  <a:srgbClr val="06287E"/>
+                </a:solidFill>
+                <a:latin typeface="Courier"/>
+              </a:rPr>
+              <a:t>data.frame</a:t>
+            </a:r>
+            <a:r>
+              <a:rPr>
+                <a:latin typeface="Courier"/>
+              </a:rPr>
+              <a:t>(</a:t>
+            </a:r>
+            <a:r>
+              <a:rPr>
+                <a:solidFill>
+                  <a:srgbClr val="7D9029"/>
+                </a:solidFill>
+                <a:latin typeface="Courier"/>
+              </a:rPr>
+              <a:t>Species =</a:t>
+            </a:r>
+            <a:r>
+              <a:rPr>
+                <a:latin typeface="Courier"/>
+              </a:rPr>
+              <a:t> </a:t>
+            </a:r>
+            <a:r>
+              <a:rPr>
+                <a:solidFill>
+                  <a:srgbClr val="06287E"/>
+                </a:solidFill>
+                <a:latin typeface="Courier"/>
+              </a:rPr>
+              <a:t>c</a:t>
+            </a:r>
+            <a:r>
+              <a:rPr>
+                <a:latin typeface="Courier"/>
+              </a:rPr>
+              <a:t>(</a:t>
+            </a:r>
+            <a:r>
+              <a:rPr>
+                <a:solidFill>
+                  <a:srgbClr val="4070A0"/>
+                </a:solidFill>
+                <a:latin typeface="Courier"/>
+              </a:rPr>
+              <a:t>"setosa"</a:t>
+            </a:r>
+            <a:r>
+              <a:rPr>
+                <a:latin typeface="Courier"/>
+              </a:rPr>
+              <a:t>, </a:t>
+            </a:r>
+            <a:r>
+              <a:rPr>
+                <a:solidFill>
+                  <a:srgbClr val="4070A0"/>
+                </a:solidFill>
+                <a:latin typeface="Courier"/>
+              </a:rPr>
+              <a:t>"versicolor"</a:t>
+            </a:r>
+            <a:r>
+              <a:rPr>
+                <a:latin typeface="Courier"/>
+              </a:rPr>
+              <a:t>, </a:t>
+            </a:r>
+            <a:r>
+              <a:rPr>
+                <a:solidFill>
+                  <a:srgbClr val="4070A0"/>
+                </a:solidFill>
+                <a:latin typeface="Courier"/>
+              </a:rPr>
+              <a:t>"virginica"</a:t>
+            </a:r>
+            <a:r>
+              <a:rPr>
+                <a:latin typeface="Courier"/>
+              </a:rPr>
+              <a:t>), </a:t>
+            </a:r>
+            <a:br/>
+            <a:r>
+              <a:rPr>
+                <a:latin typeface="Courier"/>
+              </a:rPr>
+              <a:t>                  </a:t>
+            </a:r>
+            <a:r>
+              <a:rPr>
+                <a:solidFill>
+                  <a:srgbClr val="4070A0"/>
+                </a:solidFill>
+                <a:latin typeface="Courier"/>
+              </a:rPr>
+              <a:t>"種別"</a:t>
+            </a:r>
+            <a:r>
+              <a:rPr>
+                <a:latin typeface="Courier"/>
+              </a:rPr>
+              <a:t> </a:t>
+            </a:r>
+            <a:r>
+              <a:rPr>
+                <a:solidFill>
+                  <a:srgbClr val="007020"/>
+                </a:solidFill>
+                <a:latin typeface="Courier"/>
+              </a:rPr>
+              <a:t>=</a:t>
+            </a:r>
+            <a:r>
+              <a:rPr>
+                <a:latin typeface="Courier"/>
+              </a:rPr>
+              <a:t> </a:t>
+            </a:r>
+            <a:r>
+              <a:rPr>
+                <a:solidFill>
+                  <a:srgbClr val="06287E"/>
+                </a:solidFill>
+                <a:latin typeface="Courier"/>
+              </a:rPr>
+              <a:t>c</a:t>
+            </a:r>
+            <a:r>
+              <a:rPr>
+                <a:latin typeface="Courier"/>
+              </a:rPr>
+              <a:t>(</a:t>
+            </a:r>
+            <a:r>
+              <a:rPr>
+                <a:solidFill>
+                  <a:srgbClr val="4070A0"/>
+                </a:solidFill>
+                <a:latin typeface="Courier"/>
+              </a:rPr>
+              <a:t>"ヒオウギアヤメ"</a:t>
+            </a:r>
+            <a:r>
+              <a:rPr>
+                <a:latin typeface="Courier"/>
+              </a:rPr>
+              <a:t>, </a:t>
+            </a:r>
+            <a:r>
+              <a:rPr>
+                <a:solidFill>
+                  <a:srgbClr val="4070A0"/>
+                </a:solidFill>
+                <a:latin typeface="Courier"/>
+              </a:rPr>
+              <a:t>"ブルーフラッグ"</a:t>
+            </a:r>
+            <a:r>
+              <a:rPr>
+                <a:latin typeface="Courier"/>
+              </a:rPr>
+              <a:t>, </a:t>
+            </a:r>
+            <a:r>
+              <a:rPr>
+                <a:solidFill>
+                  <a:srgbClr val="4070A0"/>
+                </a:solidFill>
+                <a:latin typeface="Courier"/>
+              </a:rPr>
+              <a:t>"バージニカ"</a:t>
+            </a:r>
+            <a:r>
+              <a:rPr>
+                <a:latin typeface="Courier"/>
+              </a:rPr>
+              <a:t>))</a:t>
+            </a:r>
+            <a:br/>
+            <a:r>
+              <a:rPr>
+                <a:latin typeface="Courier"/>
+              </a:rPr>
+              <a:t>df_iris </a:t>
+            </a:r>
+            <a:r>
+              <a:rPr>
+                <a:solidFill>
+                  <a:srgbClr val="007020"/>
+                </a:solidFill>
+                <a:latin typeface="Courier"/>
+              </a:rPr>
+              <a:t>&lt;-</a:t>
+            </a:r>
+            <a:r>
+              <a:rPr>
+                <a:latin typeface="Courier"/>
+              </a:rPr>
+              <a:t> df_iris </a:t>
+            </a:r>
+            <a:r>
+              <a:rPr>
+                <a:solidFill>
+                  <a:srgbClr val="4070A0"/>
+                </a:solidFill>
+                <a:latin typeface="Courier"/>
+              </a:rPr>
+              <a:t>%&gt;%</a:t>
+            </a:r>
+            <a:r>
+              <a:rPr>
+                <a:latin typeface="Courier"/>
+              </a:rPr>
+              <a:t> </a:t>
+            </a:r>
+            <a:r>
+              <a:rPr>
+                <a:solidFill>
+                  <a:srgbClr val="06287E"/>
+                </a:solidFill>
+                <a:latin typeface="Courier"/>
+              </a:rPr>
+              <a:t>left_join</a:t>
+            </a:r>
+            <a:r>
+              <a:rPr>
+                <a:latin typeface="Courier"/>
+              </a:rPr>
+              <a:t>(tab, </a:t>
+            </a:r>
+            <a:r>
+              <a:rPr>
+                <a:solidFill>
+                  <a:srgbClr val="7D9029"/>
+                </a:solidFill>
+                <a:latin typeface="Courier"/>
+              </a:rPr>
+              <a:t>by=</a:t>
+            </a:r>
+            <a:r>
+              <a:rPr>
+                <a:solidFill>
+                  <a:srgbClr val="06287E"/>
+                </a:solidFill>
+                <a:latin typeface="Courier"/>
+              </a:rPr>
+              <a:t>c</a:t>
+            </a:r>
+            <a:r>
+              <a:rPr>
+                <a:latin typeface="Courier"/>
+              </a:rPr>
+              <a:t>(</a:t>
+            </a:r>
+            <a:r>
+              <a:rPr>
+                <a:solidFill>
+                  <a:srgbClr val="4070A0"/>
+                </a:solidFill>
+                <a:latin typeface="Courier"/>
+              </a:rPr>
+              <a:t>"Species"</a:t>
+            </a:r>
+            <a:r>
+              <a:rPr>
+                <a:latin typeface="Courier"/>
+              </a:rPr>
+              <a:t> </a:t>
+            </a:r>
+            <a:r>
+              <a:rPr>
+                <a:solidFill>
+                  <a:srgbClr val="007020"/>
+                </a:solidFill>
+                <a:latin typeface="Courier"/>
+              </a:rPr>
+              <a:t>=</a:t>
+            </a:r>
+            <a:r>
+              <a:rPr>
+                <a:latin typeface="Courier"/>
+              </a:rPr>
+              <a:t> </a:t>
+            </a:r>
+            <a:r>
+              <a:rPr>
+                <a:solidFill>
+                  <a:srgbClr val="4070A0"/>
+                </a:solidFill>
+                <a:latin typeface="Courier"/>
+              </a:rPr>
+              <a:t>"Species"</a:t>
+            </a:r>
+            <a:r>
+              <a:rPr>
+                <a:latin typeface="Courier"/>
+              </a:rPr>
+              <a:t>)) </a:t>
+            </a:r>
+            <a:r>
+              <a:rPr>
+                <a:solidFill>
+                  <a:srgbClr val="4070A0"/>
+                </a:solidFill>
+                <a:latin typeface="Courier"/>
+              </a:rPr>
+              <a:t>%&gt;%</a:t>
+            </a:r>
+            <a:r>
+              <a:rPr>
+                <a:latin typeface="Courier"/>
+              </a:rPr>
+              <a:t> </a:t>
+            </a:r>
+            <a:r>
+              <a:rPr>
+                <a:solidFill>
+                  <a:srgbClr val="06287E"/>
+                </a:solidFill>
+                <a:latin typeface="Courier"/>
+              </a:rPr>
+              <a:t>select</a:t>
+            </a:r>
+            <a:r>
+              <a:rPr>
+                <a:latin typeface="Courier"/>
+              </a:rPr>
+              <a:t>(</a:t>
+            </a:r>
+            <a:r>
+              <a:rPr>
+                <a:solidFill>
+                  <a:srgbClr val="4070A0"/>
+                </a:solidFill>
+                <a:latin typeface="Courier"/>
+              </a:rPr>
+              <a:t>-</a:t>
+            </a:r>
+            <a:r>
+              <a:rPr>
+                <a:solidFill>
+                  <a:srgbClr val="40A070"/>
+                </a:solidFill>
+                <a:latin typeface="Courier"/>
+              </a:rPr>
+              <a:t>5</a:t>
+            </a:r>
+            <a:r>
+              <a:rPr>
+                <a:latin typeface="Courier"/>
+              </a:rPr>
+              <a:t>)</a:t>
+            </a:r>
+            <a:br/>
+            <a:r>
+              <a:rPr>
+                <a:latin typeface="Courier"/>
+              </a:rPr>
+              <a:t>df_iris </a:t>
+            </a:r>
+            <a:r>
+              <a:rPr>
+                <a:solidFill>
+                  <a:srgbClr val="4070A0"/>
+                </a:solidFill>
+                <a:latin typeface="Courier"/>
+              </a:rPr>
+              <a:t>%&gt;%</a:t>
+            </a:r>
+            <a:r>
+              <a:rPr>
+                <a:latin typeface="Courier"/>
+              </a:rPr>
+              <a:t> </a:t>
+            </a:r>
+            <a:r>
+              <a:rPr>
+                <a:solidFill>
+                  <a:srgbClr val="06287E"/>
+                </a:solidFill>
+                <a:latin typeface="Courier"/>
+              </a:rPr>
+              <a:t>slice</a:t>
+            </a:r>
+            <a:r>
+              <a:rPr>
+                <a:latin typeface="Courier"/>
+              </a:rPr>
+              <a:t>(</a:t>
+            </a:r>
+            <a:r>
+              <a:rPr>
+                <a:solidFill>
+                  <a:srgbClr val="40A070"/>
+                </a:solidFill>
+                <a:latin typeface="Courier"/>
+              </a:rPr>
+              <a:t>1</a:t>
+            </a:r>
+            <a:r>
+              <a:rPr>
+                <a:solidFill>
+                  <a:srgbClr val="4070A0"/>
+                </a:solidFill>
+                <a:latin typeface="Courier"/>
+              </a:rPr>
+              <a:t>:</a:t>
+            </a:r>
+            <a:r>
+              <a:rPr>
+                <a:solidFill>
+                  <a:srgbClr val="40A070"/>
+                </a:solidFill>
+                <a:latin typeface="Courier"/>
+              </a:rPr>
+              <a:t>2</a:t>
+            </a:r>
+            <a:r>
+              <a:rPr>
+                <a:latin typeface="Courier"/>
+              </a:rPr>
+              <a:t>)</a:t>
+            </a:r>
+          </a:p>
+          <a:p>
+            <a:pPr lvl="0" indent="0">
+              <a:buNone/>
+            </a:pPr>
+            <a:r>
+              <a:rPr>
+                <a:latin typeface="Courier"/>
+              </a:rPr>
+              <a:t>##   萼長 萼幅 葉長 葉幅           種別
+## 1  5.1  3.5  1.4  0.2 ヒオウギアヤメ
+## 2  4.9  3.0  1.4  0.2 ヒオウギアヤメ</a:t>
+            </a:r>
+          </a:p>
+        </p:txBody>
+      </p:sp>
+    </p:spTree>
+  </p:cSld>
+</p:sld>
+</file>
+
+<file path=ppt/slides/slide8.xml><?xml version="1.0" encoding="utf-8"?>
+<p:sld xmlns:a="http://schemas.openxmlformats.org/drawingml/2006/main" xmlns:r="http://schemas.openxmlformats.org/officeDocument/2006/relationships" xmlns:p="http://schemas.openxmlformats.org/presentationml/2006/main">
+  <p:cSld>
+    <p:spTree>
+      <p:nvGrpSpPr>
+        <p:cNvPr id="1" name=""/>
+        <p:cNvGrpSpPr/>
+        <p:nvPr/>
+      </p:nvGrpSpPr>
+      <p:grpSpPr>
+        <a:xfrm>
+          <a:off x="0" y="0"/>
+          <a:ext cx="0" cy="0"/>
+          <a:chOff x="0" y="0"/>
+          <a:chExt cx="0" cy="0"/>
+        </a:xfrm>
+      </p:grpSpPr>
+      <p:sp>
+        <p:nvSpPr>
           <p:cNvPr id="4" name="Text Placeholder 3"/>
           <p:cNvSpPr>
             <a:spLocks noGrp="1"/>
@@ -3988,698 +5266,6 @@
         <p:txBody>
           <a:bodyPr/>
           <a:lstStyle/>
-          <a:p>
-            <a:pPr lvl="0" indent="0">
-              <a:buNone/>
-            </a:pPr>
-            <a:r>
-              <a:rPr>
-                <a:latin typeface="Courier"/>
-              </a:rPr>
-              <a:t>df_iris </a:t>
-            </a:r>
-            <a:r>
-              <a:rPr>
-                <a:solidFill>
-                  <a:srgbClr val="007020"/>
-                </a:solidFill>
-                <a:latin typeface="Courier"/>
-              </a:rPr>
-              <a:t>&lt;-</a:t>
-            </a:r>
-            <a:r>
-              <a:rPr>
-                <a:latin typeface="Courier"/>
-              </a:rPr>
-              <a:t> iris</a:t>
-            </a:r>
-            <a:br/>
-            <a:r>
-              <a:rPr>
-                <a:solidFill>
-                  <a:srgbClr val="06287E"/>
-                </a:solidFill>
-                <a:latin typeface="Courier"/>
-              </a:rPr>
-              <a:t>colnames</a:t>
-            </a:r>
-            <a:r>
-              <a:rPr>
-                <a:latin typeface="Courier"/>
-              </a:rPr>
-              <a:t>(df_iris) </a:t>
-            </a:r>
-            <a:r>
-              <a:rPr>
-                <a:solidFill>
-                  <a:srgbClr val="007020"/>
-                </a:solidFill>
-                <a:latin typeface="Courier"/>
-              </a:rPr>
-              <a:t>&lt;-</a:t>
-            </a:r>
-            <a:r>
-              <a:rPr>
-                <a:latin typeface="Courier"/>
-              </a:rPr>
-              <a:t> </a:t>
-            </a:r>
-            <a:r>
-              <a:rPr>
-                <a:solidFill>
-                  <a:srgbClr val="06287E"/>
-                </a:solidFill>
-                <a:latin typeface="Courier"/>
-              </a:rPr>
-              <a:t>c</a:t>
-            </a:r>
-            <a:r>
-              <a:rPr>
-                <a:latin typeface="Courier"/>
-              </a:rPr>
-              <a:t>(</a:t>
-            </a:r>
-            <a:r>
-              <a:rPr>
-                <a:solidFill>
-                  <a:srgbClr val="4070A0"/>
-                </a:solidFill>
-                <a:latin typeface="Courier"/>
-              </a:rPr>
-              <a:t>"萼長"</a:t>
-            </a:r>
-            <a:r>
-              <a:rPr>
-                <a:latin typeface="Courier"/>
-              </a:rPr>
-              <a:t>,</a:t>
-            </a:r>
-            <a:r>
-              <a:rPr>
-                <a:solidFill>
-                  <a:srgbClr val="4070A0"/>
-                </a:solidFill>
-                <a:latin typeface="Courier"/>
-              </a:rPr>
-              <a:t>"萼幅"</a:t>
-            </a:r>
-            <a:r>
-              <a:rPr>
-                <a:latin typeface="Courier"/>
-              </a:rPr>
-              <a:t>,</a:t>
-            </a:r>
-            <a:r>
-              <a:rPr>
-                <a:solidFill>
-                  <a:srgbClr val="4070A0"/>
-                </a:solidFill>
-                <a:latin typeface="Courier"/>
-              </a:rPr>
-              <a:t>"葉長"</a:t>
-            </a:r>
-            <a:r>
-              <a:rPr>
-                <a:latin typeface="Courier"/>
-              </a:rPr>
-              <a:t>,</a:t>
-            </a:r>
-            <a:r>
-              <a:rPr>
-                <a:solidFill>
-                  <a:srgbClr val="4070A0"/>
-                </a:solidFill>
-                <a:latin typeface="Courier"/>
-              </a:rPr>
-              <a:t>"葉幅"</a:t>
-            </a:r>
-            <a:r>
-              <a:rPr>
-                <a:latin typeface="Courier"/>
-              </a:rPr>
-              <a:t>,</a:t>
-            </a:r>
-            <a:r>
-              <a:rPr>
-                <a:solidFill>
-                  <a:srgbClr val="4070A0"/>
-                </a:solidFill>
-                <a:latin typeface="Courier"/>
-              </a:rPr>
-              <a:t>"Species"</a:t>
-            </a:r>
-            <a:r>
-              <a:rPr>
-                <a:latin typeface="Courier"/>
-              </a:rPr>
-              <a:t> )</a:t>
-            </a:r>
-            <a:br/>
-            <a:r>
-              <a:rPr>
-                <a:latin typeface="Courier"/>
-              </a:rPr>
-              <a:t>tab </a:t>
-            </a:r>
-            <a:r>
-              <a:rPr>
-                <a:solidFill>
-                  <a:srgbClr val="007020"/>
-                </a:solidFill>
-                <a:latin typeface="Courier"/>
-              </a:rPr>
-              <a:t>&lt;-</a:t>
-            </a:r>
-            <a:r>
-              <a:rPr>
-                <a:latin typeface="Courier"/>
-              </a:rPr>
-              <a:t> </a:t>
-            </a:r>
-            <a:r>
-              <a:rPr>
-                <a:solidFill>
-                  <a:srgbClr val="06287E"/>
-                </a:solidFill>
-                <a:latin typeface="Courier"/>
-              </a:rPr>
-              <a:t>data.frame</a:t>
-            </a:r>
-            <a:r>
-              <a:rPr>
-                <a:latin typeface="Courier"/>
-              </a:rPr>
-              <a:t>(</a:t>
-            </a:r>
-            <a:r>
-              <a:rPr>
-                <a:solidFill>
-                  <a:srgbClr val="7D9029"/>
-                </a:solidFill>
-                <a:latin typeface="Courier"/>
-              </a:rPr>
-              <a:t>Species =</a:t>
-            </a:r>
-            <a:r>
-              <a:rPr>
-                <a:latin typeface="Courier"/>
-              </a:rPr>
-              <a:t> </a:t>
-            </a:r>
-            <a:r>
-              <a:rPr>
-                <a:solidFill>
-                  <a:srgbClr val="06287E"/>
-                </a:solidFill>
-                <a:latin typeface="Courier"/>
-              </a:rPr>
-              <a:t>c</a:t>
-            </a:r>
-            <a:r>
-              <a:rPr>
-                <a:latin typeface="Courier"/>
-              </a:rPr>
-              <a:t>(</a:t>
-            </a:r>
-            <a:r>
-              <a:rPr>
-                <a:solidFill>
-                  <a:srgbClr val="4070A0"/>
-                </a:solidFill>
-                <a:latin typeface="Courier"/>
-              </a:rPr>
-              <a:t>"setosa"</a:t>
-            </a:r>
-            <a:r>
-              <a:rPr>
-                <a:latin typeface="Courier"/>
-              </a:rPr>
-              <a:t>, </a:t>
-            </a:r>
-            <a:r>
-              <a:rPr>
-                <a:solidFill>
-                  <a:srgbClr val="4070A0"/>
-                </a:solidFill>
-                <a:latin typeface="Courier"/>
-              </a:rPr>
-              <a:t>"versicolor"</a:t>
-            </a:r>
-            <a:r>
-              <a:rPr>
-                <a:latin typeface="Courier"/>
-              </a:rPr>
-              <a:t>, </a:t>
-            </a:r>
-            <a:r>
-              <a:rPr>
-                <a:solidFill>
-                  <a:srgbClr val="4070A0"/>
-                </a:solidFill>
-                <a:latin typeface="Courier"/>
-              </a:rPr>
-              <a:t>"virginica"</a:t>
-            </a:r>
-            <a:r>
-              <a:rPr>
-                <a:latin typeface="Courier"/>
-              </a:rPr>
-              <a:t>), </a:t>
-            </a:r>
-            <a:r>
-              <a:rPr>
-                <a:solidFill>
-                  <a:srgbClr val="4070A0"/>
-                </a:solidFill>
-                <a:latin typeface="Courier"/>
-              </a:rPr>
-              <a:t>"種別"</a:t>
-            </a:r>
-            <a:r>
-              <a:rPr>
-                <a:latin typeface="Courier"/>
-              </a:rPr>
-              <a:t> </a:t>
-            </a:r>
-            <a:r>
-              <a:rPr>
-                <a:solidFill>
-                  <a:srgbClr val="007020"/>
-                </a:solidFill>
-                <a:latin typeface="Courier"/>
-              </a:rPr>
-              <a:t>=</a:t>
-            </a:r>
-            <a:r>
-              <a:rPr>
-                <a:latin typeface="Courier"/>
-              </a:rPr>
-              <a:t> </a:t>
-            </a:r>
-            <a:r>
-              <a:rPr>
-                <a:solidFill>
-                  <a:srgbClr val="06287E"/>
-                </a:solidFill>
-                <a:latin typeface="Courier"/>
-              </a:rPr>
-              <a:t>c</a:t>
-            </a:r>
-            <a:r>
-              <a:rPr>
-                <a:latin typeface="Courier"/>
-              </a:rPr>
-              <a:t>(</a:t>
-            </a:r>
-            <a:r>
-              <a:rPr>
-                <a:solidFill>
-                  <a:srgbClr val="4070A0"/>
-                </a:solidFill>
-                <a:latin typeface="Courier"/>
-              </a:rPr>
-              <a:t>"ヒオウギアヤメ"</a:t>
-            </a:r>
-            <a:r>
-              <a:rPr>
-                <a:latin typeface="Courier"/>
-              </a:rPr>
-              <a:t>, </a:t>
-            </a:r>
-            <a:r>
-              <a:rPr>
-                <a:solidFill>
-                  <a:srgbClr val="4070A0"/>
-                </a:solidFill>
-                <a:latin typeface="Courier"/>
-              </a:rPr>
-              <a:t>"ブルーフラッグ"</a:t>
-            </a:r>
-            <a:r>
-              <a:rPr>
-                <a:latin typeface="Courier"/>
-              </a:rPr>
-              <a:t>, </a:t>
-            </a:r>
-            <a:r>
-              <a:rPr>
-                <a:solidFill>
-                  <a:srgbClr val="4070A0"/>
-                </a:solidFill>
-                <a:latin typeface="Courier"/>
-              </a:rPr>
-              <a:t>"バージニカ"</a:t>
-            </a:r>
-            <a:r>
-              <a:rPr>
-                <a:latin typeface="Courier"/>
-              </a:rPr>
-              <a:t>))</a:t>
-            </a:r>
-            <a:br/>
-            <a:r>
-              <a:rPr>
-                <a:latin typeface="Courier"/>
-              </a:rPr>
-              <a:t>df_iris </a:t>
-            </a:r>
-            <a:r>
-              <a:rPr>
-                <a:solidFill>
-                  <a:srgbClr val="007020"/>
-                </a:solidFill>
-                <a:latin typeface="Courier"/>
-              </a:rPr>
-              <a:t>&lt;-</a:t>
-            </a:r>
-            <a:r>
-              <a:rPr>
-                <a:latin typeface="Courier"/>
-              </a:rPr>
-              <a:t> df_iris </a:t>
-            </a:r>
-            <a:r>
-              <a:rPr>
-                <a:solidFill>
-                  <a:srgbClr val="4070A0"/>
-                </a:solidFill>
-                <a:latin typeface="Courier"/>
-              </a:rPr>
-              <a:t>%&gt;%</a:t>
-            </a:r>
-            <a:r>
-              <a:rPr>
-                <a:latin typeface="Courier"/>
-              </a:rPr>
-              <a:t> </a:t>
-            </a:r>
-            <a:r>
-              <a:rPr>
-                <a:solidFill>
-                  <a:srgbClr val="06287E"/>
-                </a:solidFill>
-                <a:latin typeface="Courier"/>
-              </a:rPr>
-              <a:t>left_join</a:t>
-            </a:r>
-            <a:r>
-              <a:rPr>
-                <a:latin typeface="Courier"/>
-              </a:rPr>
-              <a:t>(tab, </a:t>
-            </a:r>
-            <a:r>
-              <a:rPr>
-                <a:solidFill>
-                  <a:srgbClr val="7D9029"/>
-                </a:solidFill>
-                <a:latin typeface="Courier"/>
-              </a:rPr>
-              <a:t>by=</a:t>
-            </a:r>
-            <a:r>
-              <a:rPr>
-                <a:solidFill>
-                  <a:srgbClr val="06287E"/>
-                </a:solidFill>
-                <a:latin typeface="Courier"/>
-              </a:rPr>
-              <a:t>c</a:t>
-            </a:r>
-            <a:r>
-              <a:rPr>
-                <a:latin typeface="Courier"/>
-              </a:rPr>
-              <a:t>(</a:t>
-            </a:r>
-            <a:r>
-              <a:rPr>
-                <a:solidFill>
-                  <a:srgbClr val="4070A0"/>
-                </a:solidFill>
-                <a:latin typeface="Courier"/>
-              </a:rPr>
-              <a:t>"Species"</a:t>
-            </a:r>
-            <a:r>
-              <a:rPr>
-                <a:latin typeface="Courier"/>
-              </a:rPr>
-              <a:t> </a:t>
-            </a:r>
-            <a:r>
-              <a:rPr>
-                <a:solidFill>
-                  <a:srgbClr val="007020"/>
-                </a:solidFill>
-                <a:latin typeface="Courier"/>
-              </a:rPr>
-              <a:t>=</a:t>
-            </a:r>
-            <a:r>
-              <a:rPr>
-                <a:latin typeface="Courier"/>
-              </a:rPr>
-              <a:t> </a:t>
-            </a:r>
-            <a:r>
-              <a:rPr>
-                <a:solidFill>
-                  <a:srgbClr val="4070A0"/>
-                </a:solidFill>
-                <a:latin typeface="Courier"/>
-              </a:rPr>
-              <a:t>"Species"</a:t>
-            </a:r>
-            <a:r>
-              <a:rPr>
-                <a:latin typeface="Courier"/>
-              </a:rPr>
-              <a:t>)) </a:t>
-            </a:r>
-            <a:r>
-              <a:rPr>
-                <a:solidFill>
-                  <a:srgbClr val="4070A0"/>
-                </a:solidFill>
-                <a:latin typeface="Courier"/>
-              </a:rPr>
-              <a:t>%&gt;%</a:t>
-            </a:r>
-            <a:r>
-              <a:rPr>
-                <a:latin typeface="Courier"/>
-              </a:rPr>
-              <a:t> </a:t>
-            </a:r>
-            <a:r>
-              <a:rPr>
-                <a:solidFill>
-                  <a:srgbClr val="06287E"/>
-                </a:solidFill>
-                <a:latin typeface="Courier"/>
-              </a:rPr>
-              <a:t>select</a:t>
-            </a:r>
-            <a:r>
-              <a:rPr>
-                <a:latin typeface="Courier"/>
-              </a:rPr>
-              <a:t>(</a:t>
-            </a:r>
-            <a:r>
-              <a:rPr>
-                <a:solidFill>
-                  <a:srgbClr val="4070A0"/>
-                </a:solidFill>
-                <a:latin typeface="Courier"/>
-              </a:rPr>
-              <a:t>-</a:t>
-            </a:r>
-            <a:r>
-              <a:rPr>
-                <a:solidFill>
-                  <a:srgbClr val="40A070"/>
-                </a:solidFill>
-                <a:latin typeface="Courier"/>
-              </a:rPr>
-              <a:t>5</a:t>
-            </a:r>
-            <a:r>
-              <a:rPr>
-                <a:latin typeface="Courier"/>
-              </a:rPr>
-              <a:t>)</a:t>
-            </a:r>
-            <a:br/>
-            <a:r>
-              <a:rPr>
-                <a:latin typeface="Courier"/>
-              </a:rPr>
-              <a:t>df_iris</a:t>
-            </a:r>
-          </a:p>
-          <a:p>
-            <a:pPr lvl="0" indent="0">
-              <a:buNone/>
-            </a:pPr>
-            <a:r>
-              <a:rPr>
-                <a:latin typeface="Courier"/>
-              </a:rPr>
-              <a:t>##     萼長 萼幅 葉長 葉幅           種別
-## 1    5.1  3.5  1.4  0.2 ヒオウギアヤメ
-## 2    4.9  3.0  1.4  0.2 ヒオウギアヤメ
-## 3    4.7  3.2  1.3  0.2 ヒオウギアヤメ
-## 4    4.6  3.1  1.5  0.2 ヒオウギアヤメ
-## 5    5.0  3.6  1.4  0.2 ヒオウギアヤメ
-## 6    5.4  3.9  1.7  0.4 ヒオウギアヤメ
-## 7    4.6  3.4  1.4  0.3 ヒオウギアヤメ
-## 8    5.0  3.4  1.5  0.2 ヒオウギアヤメ
-## 9    4.4  2.9  1.4  0.2 ヒオウギアヤメ
-## 10   4.9  3.1  1.5  0.1 ヒオウギアヤメ
-## 11   5.4  3.7  1.5  0.2 ヒオウギアヤメ
-## 12   4.8  3.4  1.6  0.2 ヒオウギアヤメ
-## 13   4.8  3.0  1.4  0.1 ヒオウギアヤメ
-## 14   4.3  3.0  1.1  0.1 ヒオウギアヤメ
-## 15   5.8  4.0  1.2  0.2 ヒオウギアヤメ
-## 16   5.7  4.4  1.5  0.4 ヒオウギアヤメ
-## 17   5.4  3.9  1.3  0.4 ヒオウギアヤメ
-## 18   5.1  3.5  1.4  0.3 ヒオウギアヤメ
-## 19   5.7  3.8  1.7  0.3 ヒオウギアヤメ
-## 20   5.1  3.8  1.5  0.3 ヒオウギアヤメ
-## 21   5.4  3.4  1.7  0.2 ヒオウギアヤメ
-## 22   5.1  3.7  1.5  0.4 ヒオウギアヤメ
-## 23   4.6  3.6  1.0  0.2 ヒオウギアヤメ
-## 24   5.1  3.3  1.7  0.5 ヒオウギアヤメ
-## 25   4.8  3.4  1.9  0.2 ヒオウギアヤメ
-## 26   5.0  3.0  1.6  0.2 ヒオウギアヤメ
-## 27   5.0  3.4  1.6  0.4 ヒオウギアヤメ
-## 28   5.2  3.5  1.5  0.2 ヒオウギアヤメ
-## 29   5.2  3.4  1.4  0.2 ヒオウギアヤメ
-## 30   4.7  3.2  1.6  0.2 ヒオウギアヤメ
-## 31   4.8  3.1  1.6  0.2 ヒオウギアヤメ
-## 32   5.4  3.4  1.5  0.4 ヒオウギアヤメ
-## 33   5.2  4.1  1.5  0.1 ヒオウギアヤメ
-## 34   5.5  4.2  1.4  0.2 ヒオウギアヤメ
-## 35   4.9  3.1  1.5  0.2 ヒオウギアヤメ
-## 36   5.0  3.2  1.2  0.2 ヒオウギアヤメ
-## 37   5.5  3.5  1.3  0.2 ヒオウギアヤメ
-## 38   4.9  3.6  1.4  0.1 ヒオウギアヤメ
-## 39   4.4  3.0  1.3  0.2 ヒオウギアヤメ
-## 40   5.1  3.4  1.5  0.2 ヒオウギアヤメ
-## 41   5.0  3.5  1.3  0.3 ヒオウギアヤメ
-## 42   4.5  2.3  1.3  0.3 ヒオウギアヤメ
-## 43   4.4  3.2  1.3  0.2 ヒオウギアヤメ
-## 44   5.0  3.5  1.6  0.6 ヒオウギアヤメ
-## 45   5.1  3.8  1.9  0.4 ヒオウギアヤメ
-## 46   4.8  3.0  1.4  0.3 ヒオウギアヤメ
-## 47   5.1  3.8  1.6  0.2 ヒオウギアヤメ
-## 48   4.6  3.2  1.4  0.2 ヒオウギアヤメ
-## 49   5.3  3.7  1.5  0.2 ヒオウギアヤメ
-## 50   5.0  3.3  1.4  0.2 ヒオウギアヤメ
-## 51   7.0  3.2  4.7  1.4 ブルーフラッグ
-## 52   6.4  3.2  4.5  1.5 ブルーフラッグ
-## 53   6.9  3.1  4.9  1.5 ブルーフラッグ
-## 54   5.5  2.3  4.0  1.3 ブルーフラッグ
-## 55   6.5  2.8  4.6  1.5 ブルーフラッグ
-## 56   5.7  2.8  4.5  1.3 ブルーフラッグ
-## 57   6.3  3.3  4.7  1.6 ブルーフラッグ
-## 58   4.9  2.4  3.3  1.0 ブルーフラッグ
-## 59   6.6  2.9  4.6  1.3 ブルーフラッグ
-## 60   5.2  2.7  3.9  1.4 ブルーフラッグ
-## 61   5.0  2.0  3.5  1.0 ブルーフラッグ
-## 62   5.9  3.0  4.2  1.5 ブルーフラッグ
-## 63   6.0  2.2  4.0  1.0 ブルーフラッグ
-## 64   6.1  2.9  4.7  1.4 ブルーフラッグ
-## 65   5.6  2.9  3.6  1.3 ブルーフラッグ
-## 66   6.7  3.1  4.4  1.4 ブルーフラッグ
-## 67   5.6  3.0  4.5  1.5 ブルーフラッグ
-## 68   5.8  2.7  4.1  1.0 ブルーフラッグ
-## 69   6.2  2.2  4.5  1.5 ブルーフラッグ
-## 70   5.6  2.5  3.9  1.1 ブルーフラッグ
-## 71   5.9  3.2  4.8  1.8 ブルーフラッグ
-## 72   6.1  2.8  4.0  1.3 ブルーフラッグ
-## 73   6.3  2.5  4.9  1.5 ブルーフラッグ
-## 74   6.1  2.8  4.7  1.2 ブルーフラッグ
-## 75   6.4  2.9  4.3  1.3 ブルーフラッグ
-## 76   6.6  3.0  4.4  1.4 ブルーフラッグ
-## 77   6.8  2.8  4.8  1.4 ブルーフラッグ
-## 78   6.7  3.0  5.0  1.7 ブルーフラッグ
-## 79   6.0  2.9  4.5  1.5 ブルーフラッグ
-## 80   5.7  2.6  3.5  1.0 ブルーフラッグ
-## 81   5.5  2.4  3.8  1.1 ブルーフラッグ
-## 82   5.5  2.4  3.7  1.0 ブルーフラッグ
-## 83   5.8  2.7  3.9  1.2 ブルーフラッグ
-## 84   6.0  2.7  5.1  1.6 ブルーフラッグ
-## 85   5.4  3.0  4.5  1.5 ブルーフラッグ
-## 86   6.0  3.4  4.5  1.6 ブルーフラッグ
-## 87   6.7  3.1  4.7  1.5 ブルーフラッグ
-## 88   6.3  2.3  4.4  1.3 ブルーフラッグ
-## 89   5.6  3.0  4.1  1.3 ブルーフラッグ
-## 90   5.5  2.5  4.0  1.3 ブルーフラッグ
-## 91   5.5  2.6  4.4  1.2 ブルーフラッグ
-## 92   6.1  3.0  4.6  1.4 ブルーフラッグ
-## 93   5.8  2.6  4.0  1.2 ブルーフラッグ
-## 94   5.0  2.3  3.3  1.0 ブルーフラッグ
-## 95   5.6  2.7  4.2  1.3 ブルーフラッグ
-## 96   5.7  3.0  4.2  1.2 ブルーフラッグ
-## 97   5.7  2.9  4.2  1.3 ブルーフラッグ
-## 98   6.2  2.9  4.3  1.3 ブルーフラッグ
-## 99   5.1  2.5  3.0  1.1 ブルーフラッグ
-## 100  5.7  2.8  4.1  1.3 ブルーフラッグ
-## 101  6.3  3.3  6.0  2.5     バージニカ
-## 102  5.8  2.7  5.1  1.9     バージニカ
-## 103  7.1  3.0  5.9  2.1     バージニカ
-## 104  6.3  2.9  5.6  1.8     バージニカ
-## 105  6.5  3.0  5.8  2.2     バージニカ
-## 106  7.6  3.0  6.6  2.1     バージニカ
-## 107  4.9  2.5  4.5  1.7     バージニカ
-## 108  7.3  2.9  6.3  1.8     バージニカ
-## 109  6.7  2.5  5.8  1.8     バージニカ
-## 110  7.2  3.6  6.1  2.5     バージニカ
-## 111  6.5  3.2  5.1  2.0     バージニカ
-## 112  6.4  2.7  5.3  1.9     バージニカ
-## 113  6.8  3.0  5.5  2.1     バージニカ
-## 114  5.7  2.5  5.0  2.0     バージニカ
-## 115  5.8  2.8  5.1  2.4     バージニカ
-## 116  6.4  3.2  5.3  2.3     バージニカ
-## 117  6.5  3.0  5.5  1.8     バージニカ
-## 118  7.7  3.8  6.7  2.2     バージニカ
-## 119  7.7  2.6  6.9  2.3     バージニカ
-## 120  6.0  2.2  5.0  1.5     バージニカ
-## 121  6.9  3.2  5.7  2.3     バージニカ
-## 122  5.6  2.8  4.9  2.0     バージニカ
-## 123  7.7  2.8  6.7  2.0     バージニカ
-## 124  6.3  2.7  4.9  1.8     バージニカ
-## 125  6.7  3.3  5.7  2.1     バージニカ
-## 126  7.2  3.2  6.0  1.8     バージニカ
-## 127  6.2  2.8  4.8  1.8     バージニカ
-## 128  6.1  3.0  4.9  1.8     バージニカ
-## 129  6.4  2.8  5.6  2.1     バージニカ
-## 130  7.2  3.0  5.8  1.6     バージニカ
-## 131  7.4  2.8  6.1  1.9     バージニカ
-## 132  7.9  3.8  6.4  2.0     バージニカ
-## 133  6.4  2.8  5.6  2.2     バージニカ
-## 134  6.3  2.8  5.1  1.5     バージニカ
-## 135  6.1  2.6  5.6  1.4     バージニカ
-## 136  7.7  3.0  6.1  2.3     バージニカ
-## 137  6.3  3.4  5.6  2.4     バージニカ
-## 138  6.4  3.1  5.5  1.8     バージニカ
-## 139  6.0  3.0  4.8  1.8     バージニカ
-## 140  6.9  3.1  5.4  2.1     バージニカ
-## 141  6.7  3.1  5.6  2.4     バージニカ
-## 142  6.9  3.1  5.1  2.3     バージニカ
-## 143  5.8  2.7  5.1  1.9     バージニカ
-## 144  6.8  3.2  5.9  2.3     バージニカ
-## 145  6.7  3.3  5.7  2.5     バージニカ
-## 146  6.7  3.0  5.2  2.3     バージニカ
-## 147  6.3  2.5  5.0  1.9     バージニカ
-## 148  6.5  3.0  5.2  2.0     バージニカ
-## 149  6.2  3.4  5.4  2.3     バージニカ
-## 150  5.9  3.0  5.1  1.8     バージニカ</a:t>
-            </a:r>
-          </a:p>
           <a:p>
             <a:pPr lvl="0" indent="0">
               <a:buNone/>
@@ -5330,563 +5916,6 @@
 </p:sld>
 </file>
 
-<file path=ppt/slides/slide7.xml><?xml version="1.0" encoding="utf-8"?>
-<p:sld xmlns:a="http://schemas.openxmlformats.org/drawingml/2006/main" xmlns:r="http://schemas.openxmlformats.org/officeDocument/2006/relationships" xmlns:p="http://schemas.openxmlformats.org/presentationml/2006/main">
-  <p:cSld>
-    <p:spTree>
-      <p:nvGrpSpPr>
-        <p:cNvPr id="1" name=""/>
-        <p:cNvGrpSpPr/>
-        <p:nvPr/>
-      </p:nvGrpSpPr>
-      <p:grpSpPr>
-        <a:xfrm>
-          <a:off x="0" y="0"/>
-          <a:ext cx="0" cy="0"/>
-          <a:chOff x="0" y="0"/>
-          <a:chExt cx="0" cy="0"/>
-        </a:xfrm>
-      </p:grpSpPr>
-      <p:sp>
-        <p:nvSpPr>
-          <p:cNvPr id="2" name="Title 1"/>
-          <p:cNvSpPr>
-            <a:spLocks noGrp="1"/>
-          </p:cNvSpPr>
-          <p:nvPr>
-            <p:ph type="title"/>
-          </p:nvPr>
-        </p:nvSpPr>
-        <p:spPr>
-          <a:xfrm>
-            <a:off x="457201" y="204787"/>
-            <a:ext cx="3008313" cy="871538"/>
-          </a:xfrm>
-        </p:spPr>
-        <p:txBody>
-          <a:bodyPr/>
-          <a:lstStyle/>
-          <a:p>
-            <a:pPr lvl="0" indent="0" marL="0">
-              <a:buNone/>
-            </a:pPr>
-            <a:r>
-              <a:rPr/>
-              <a:t>Test Code Chunk (4)</a:t>
-            </a:r>
-          </a:p>
-        </p:txBody>
-      </p:sp>
-      <p:sp>
-        <p:nvSpPr>
-          <p:cNvPr id="4" name="Text Placeholder 3"/>
-          <p:cNvSpPr>
-            <a:spLocks noGrp="1"/>
-          </p:cNvSpPr>
-          <p:nvPr>
-            <p:ph idx="2" sz="half" type="body"/>
-          </p:nvPr>
-        </p:nvSpPr>
-        <p:spPr/>
-        <p:txBody>
-          <a:bodyPr/>
-          <a:lstStyle/>
-          <a:p>
-            <a:pPr lvl="0" indent="0">
-              <a:buNone/>
-            </a:pPr>
-            <a:r>
-              <a:rPr>
-                <a:solidFill>
-                  <a:srgbClr val="06287E"/>
-                </a:solidFill>
-                <a:latin typeface="Courier"/>
-              </a:rPr>
-              <a:t>ggplot</a:t>
-            </a:r>
-            <a:r>
-              <a:rPr>
-                <a:latin typeface="Courier"/>
-              </a:rPr>
-              <a:t>(df_iris, </a:t>
-            </a:r>
-            <a:r>
-              <a:rPr>
-                <a:solidFill>
-                  <a:srgbClr val="06287E"/>
-                </a:solidFill>
-                <a:latin typeface="Courier"/>
-              </a:rPr>
-              <a:t>aes</a:t>
-            </a:r>
-            <a:r>
-              <a:rPr>
-                <a:latin typeface="Courier"/>
-              </a:rPr>
-              <a:t>(</a:t>
-            </a:r>
-            <a:r>
-              <a:rPr>
-                <a:solidFill>
-                  <a:srgbClr val="7D9029"/>
-                </a:solidFill>
-                <a:latin typeface="Courier"/>
-              </a:rPr>
-              <a:t>x =</a:t>
-            </a:r>
-            <a:r>
-              <a:rPr>
-                <a:latin typeface="Courier"/>
-              </a:rPr>
-              <a:t> </a:t>
-            </a:r>
-            <a:r>
-              <a:rPr>
-                <a:solidFill>
-                  <a:srgbClr val="4070A0"/>
-                </a:solidFill>
-                <a:latin typeface="Courier"/>
-              </a:rPr>
-              <a:t>`</a:t>
-            </a:r>
-            <a:r>
-              <a:rPr>
-                <a:solidFill>
-                  <a:srgbClr val="7D9029"/>
-                </a:solidFill>
-                <a:latin typeface="Courier"/>
-              </a:rPr>
-              <a:t>葉長</a:t>
-            </a:r>
-            <a:r>
-              <a:rPr>
-                <a:solidFill>
-                  <a:srgbClr val="4070A0"/>
-                </a:solidFill>
-                <a:latin typeface="Courier"/>
-              </a:rPr>
-              <a:t>`</a:t>
-            </a:r>
-            <a:r>
-              <a:rPr>
-                <a:latin typeface="Courier"/>
-              </a:rPr>
-              <a:t>, </a:t>
-            </a:r>
-            <a:r>
-              <a:rPr>
-                <a:solidFill>
-                  <a:srgbClr val="7D9029"/>
-                </a:solidFill>
-                <a:latin typeface="Courier"/>
-              </a:rPr>
-              <a:t>y =</a:t>
-            </a:r>
-            <a:r>
-              <a:rPr>
-                <a:latin typeface="Courier"/>
-              </a:rPr>
-              <a:t> </a:t>
-            </a:r>
-            <a:r>
-              <a:rPr>
-                <a:solidFill>
-                  <a:srgbClr val="4070A0"/>
-                </a:solidFill>
-                <a:latin typeface="Courier"/>
-              </a:rPr>
-              <a:t>`</a:t>
-            </a:r>
-            <a:r>
-              <a:rPr>
-                <a:solidFill>
-                  <a:srgbClr val="7D9029"/>
-                </a:solidFill>
-                <a:latin typeface="Courier"/>
-              </a:rPr>
-              <a:t>葉幅</a:t>
-            </a:r>
-            <a:r>
-              <a:rPr>
-                <a:solidFill>
-                  <a:srgbClr val="4070A0"/>
-                </a:solidFill>
-                <a:latin typeface="Courier"/>
-              </a:rPr>
-              <a:t>`</a:t>
-            </a:r>
-            <a:r>
-              <a:rPr>
-                <a:latin typeface="Courier"/>
-              </a:rPr>
-              <a:t>, </a:t>
-            </a:r>
-            <a:r>
-              <a:rPr>
-                <a:solidFill>
-                  <a:srgbClr val="7D9029"/>
-                </a:solidFill>
-                <a:latin typeface="Courier"/>
-              </a:rPr>
-              <a:t>col =</a:t>
-            </a:r>
-            <a:r>
-              <a:rPr>
-                <a:latin typeface="Courier"/>
-              </a:rPr>
-              <a:t> </a:t>
-            </a:r>
-            <a:r>
-              <a:rPr>
-                <a:solidFill>
-                  <a:srgbClr val="4070A0"/>
-                </a:solidFill>
-                <a:latin typeface="Courier"/>
-              </a:rPr>
-              <a:t>`</a:t>
-            </a:r>
-            <a:r>
-              <a:rPr>
-                <a:solidFill>
-                  <a:srgbClr val="7D9029"/>
-                </a:solidFill>
-                <a:latin typeface="Courier"/>
-              </a:rPr>
-              <a:t>種別</a:t>
-            </a:r>
-            <a:r>
-              <a:rPr>
-                <a:solidFill>
-                  <a:srgbClr val="4070A0"/>
-                </a:solidFill>
-                <a:latin typeface="Courier"/>
-              </a:rPr>
-              <a:t>`</a:t>
-            </a:r>
-            <a:r>
-              <a:rPr>
-                <a:latin typeface="Courier"/>
-              </a:rPr>
-              <a:t>)) </a:t>
-            </a:r>
-            <a:r>
-              <a:rPr>
-                <a:solidFill>
-                  <a:srgbClr val="4070A0"/>
-                </a:solidFill>
-                <a:latin typeface="Courier"/>
-              </a:rPr>
-              <a:t>+</a:t>
-            </a:r>
-            <a:br/>
-            <a:r>
-              <a:rPr>
-                <a:latin typeface="Courier"/>
-              </a:rPr>
-              <a:t>  </a:t>
-            </a:r>
-            <a:r>
-              <a:rPr>
-                <a:solidFill>
-                  <a:srgbClr val="06287E"/>
-                </a:solidFill>
-                <a:latin typeface="Courier"/>
-              </a:rPr>
-              <a:t>geom_point</a:t>
-            </a:r>
-            <a:r>
-              <a:rPr>
-                <a:latin typeface="Courier"/>
-              </a:rPr>
-              <a:t>() </a:t>
-            </a:r>
-            <a:r>
-              <a:rPr>
-                <a:solidFill>
-                  <a:srgbClr val="4070A0"/>
-                </a:solidFill>
-                <a:latin typeface="Courier"/>
-              </a:rPr>
-              <a:t>+</a:t>
-            </a:r>
-            <a:r>
-              <a:rPr>
-                <a:latin typeface="Courier"/>
-              </a:rPr>
-              <a:t> </a:t>
-            </a:r>
-            <a:r>
-              <a:rPr>
-                <a:solidFill>
-                  <a:srgbClr val="06287E"/>
-                </a:solidFill>
-                <a:latin typeface="Courier"/>
-              </a:rPr>
-              <a:t>labs</a:t>
-            </a:r>
-            <a:r>
-              <a:rPr>
-                <a:latin typeface="Courier"/>
-              </a:rPr>
-              <a:t>(</a:t>
-            </a:r>
-            <a:r>
-              <a:rPr>
-                <a:solidFill>
-                  <a:srgbClr val="7D9029"/>
-                </a:solidFill>
-                <a:latin typeface="Courier"/>
-              </a:rPr>
-              <a:t>title =</a:t>
-            </a:r>
-            <a:r>
-              <a:rPr>
-                <a:latin typeface="Courier"/>
-              </a:rPr>
-              <a:t> </a:t>
-            </a:r>
-            <a:r>
-              <a:rPr>
-                <a:solidFill>
-                  <a:srgbClr val="4070A0"/>
-                </a:solidFill>
-                <a:latin typeface="Courier"/>
-              </a:rPr>
-              <a:t>"散布図"</a:t>
-            </a:r>
-            <a:r>
-              <a:rPr>
-                <a:latin typeface="Courier"/>
-              </a:rPr>
-              <a:t>, </a:t>
-            </a:r>
-            <a:r>
-              <a:rPr>
-                <a:solidFill>
-                  <a:srgbClr val="7D9029"/>
-                </a:solidFill>
-                <a:latin typeface="Courier"/>
-              </a:rPr>
-              <a:t>x =</a:t>
-            </a:r>
-            <a:r>
-              <a:rPr>
-                <a:latin typeface="Courier"/>
-              </a:rPr>
-              <a:t> </a:t>
-            </a:r>
-            <a:r>
-              <a:rPr>
-                <a:solidFill>
-                  <a:srgbClr val="4070A0"/>
-                </a:solidFill>
-                <a:latin typeface="Courier"/>
-              </a:rPr>
-              <a:t>"葉長"</a:t>
-            </a:r>
-            <a:r>
-              <a:rPr>
-                <a:latin typeface="Courier"/>
-              </a:rPr>
-              <a:t>, </a:t>
-            </a:r>
-            <a:r>
-              <a:rPr>
-                <a:solidFill>
-                  <a:srgbClr val="7D9029"/>
-                </a:solidFill>
-                <a:latin typeface="Courier"/>
-              </a:rPr>
-              <a:t>y =</a:t>
-            </a:r>
-            <a:r>
-              <a:rPr>
-                <a:latin typeface="Courier"/>
-              </a:rPr>
-              <a:t> </a:t>
-            </a:r>
-            <a:r>
-              <a:rPr>
-                <a:solidFill>
-                  <a:srgbClr val="4070A0"/>
-                </a:solidFill>
-                <a:latin typeface="Courier"/>
-              </a:rPr>
-              <a:t>"葉幅"</a:t>
-            </a:r>
-            <a:r>
-              <a:rPr>
-                <a:latin typeface="Courier"/>
-              </a:rPr>
-              <a:t>)</a:t>
-            </a:r>
-          </a:p>
-        </p:txBody>
-      </p:sp>
-      <p:pic>
-        <p:nvPicPr>
-          <p:cNvPr descr="Rmarkdown-J_files/figure-pptx/unnamed-chunk-5-1.png" id="0" name="Picture 1"/>
-          <p:cNvPicPr>
-            <a:picLocks noGrp="1" noChangeAspect="1"/>
-          </p:cNvPicPr>
-          <p:nvPr/>
-        </p:nvPicPr>
-        <p:blipFill>
-          <a:blip r:embed="rId2"/>
-          <a:stretch>
-            <a:fillRect/>
-          </a:stretch>
-        </p:blipFill>
-        <p:spPr bwMode="auto">
-          <a:xfrm>
-            <a:off x="3568700" y="355600"/>
-            <a:ext cx="5105400" cy="4089400"/>
-          </a:xfrm>
-          <a:prstGeom prst="rect">
-            <a:avLst/>
-          </a:prstGeom>
-          <a:noFill/>
-          <a:ln w="9525">
-            <a:noFill/>
-            <a:headEnd/>
-            <a:tailEnd/>
-          </a:ln>
-        </p:spPr>
-      </p:pic>
-    </p:spTree>
-  </p:cSld>
-</p:sld>
-</file>
-
-<file path=ppt/slides/slide8.xml><?xml version="1.0" encoding="utf-8"?>
-<p:sld xmlns:a="http://schemas.openxmlformats.org/drawingml/2006/main" xmlns:r="http://schemas.openxmlformats.org/officeDocument/2006/relationships" xmlns:p="http://schemas.openxmlformats.org/presentationml/2006/main">
-  <p:cSld>
-    <p:spTree>
-      <p:nvGrpSpPr>
-        <p:cNvPr id="1" name=""/>
-        <p:cNvGrpSpPr/>
-        <p:nvPr/>
-      </p:nvGrpSpPr>
-      <p:grpSpPr>
-        <a:xfrm>
-          <a:off x="0" y="0"/>
-          <a:ext cx="0" cy="0"/>
-          <a:chOff x="0" y="0"/>
-          <a:chExt cx="0" cy="0"/>
-        </a:xfrm>
-      </p:grpSpPr>
-      <p:sp>
-        <p:nvSpPr>
-          <p:cNvPr id="2" name="Title 1"/>
-          <p:cNvSpPr>
-            <a:spLocks noGrp="1"/>
-          </p:cNvSpPr>
-          <p:nvPr>
-            <p:ph type="title"/>
-          </p:nvPr>
-        </p:nvSpPr>
-        <p:spPr/>
-        <p:txBody>
-          <a:bodyPr/>
-          <a:lstStyle/>
-          <a:p>
-            <a:pPr lvl="0" indent="0" marL="0">
-              <a:buNone/>
-            </a:pPr>
-            <a:r>
-              <a:rPr/>
-              <a:t>New Code Chunk</a:t>
-            </a:r>
-          </a:p>
-        </p:txBody>
-      </p:sp>
-      <p:sp>
-        <p:nvSpPr>
-          <p:cNvPr id="3" name="Content Placeholder 2"/>
-          <p:cNvSpPr>
-            <a:spLocks noGrp="1"/>
-          </p:cNvSpPr>
-          <p:nvPr>
-            <p:ph idx="1"/>
-          </p:nvPr>
-        </p:nvSpPr>
-        <p:spPr/>
-        <p:txBody>
-          <a:bodyPr/>
-          <a:lstStyle/>
-          <a:p>
-            <a:pPr lvl="0" indent="0" marL="0">
-              <a:buNone/>
-            </a:pPr>
-            <a:r>
-              <a:rPr/>
-              <a:t>あらたにコード・チャンクを挿入するときは、ツール・バーの </a:t>
-            </a:r>
-            <a:r>
-              <a:rPr i="1"/>
-              <a:t>Insert Chunk</a:t>
-            </a:r>
-            <a:r>
-              <a:rPr/>
-              <a:t> ボタンを押すか、または、 </a:t>
-            </a:r>
-            <a:r>
-              <a:rPr i="1"/>
-              <a:t>Ctrl+Option+I</a:t>
-            </a:r>
-            <a:r>
-              <a:rPr/>
-              <a:t> (Win) or </a:t>
-            </a:r>
-            <a:r>
-              <a:rPr i="1"/>
-              <a:t>Cmd+Option+I</a:t>
-            </a:r>
-            <a:r>
-              <a:rPr/>
-              <a:t> (Mac) でも可能です。</a:t>
-            </a:r>
-          </a:p>
-          <a:p>
-            <a:pPr lvl="0" indent="0" marL="0">
-              <a:buNone/>
-            </a:pPr>
-            <a:r>
-              <a:rPr/>
-              <a:t>When you save the notebook, an HTML file containing the code and output will be saved alongside it (click the </a:t>
-            </a:r>
-            <a:r>
-              <a:rPr i="1"/>
-              <a:t>Preview</a:t>
-            </a:r>
-            <a:r>
-              <a:rPr/>
-              <a:t> button or press </a:t>
-            </a:r>
-            <a:r>
-              <a:rPr i="1"/>
-              <a:t>Ctrl+Shift+K</a:t>
-            </a:r>
-            <a:r>
-              <a:rPr/>
-              <a:t> (Win) or </a:t>
-            </a:r>
-            <a:r>
-              <a:rPr i="1"/>
-              <a:t>Cmd+Shift+K</a:t>
-            </a:r>
-            <a:r>
-              <a:rPr/>
-              <a:t> (Mac) to preview the HTML file).</a:t>
-            </a:r>
-          </a:p>
-        </p:txBody>
-      </p:sp>
-    </p:spTree>
-  </p:cSld>
-</p:sld>
-</file>
-
 <file path=ppt/slides/slide9.xml><?xml version="1.0" encoding="utf-8"?>
 <p:sld xmlns:a="http://schemas.openxmlformats.org/drawingml/2006/main" xmlns:r="http://schemas.openxmlformats.org/officeDocument/2006/relationships" xmlns:p="http://schemas.openxmlformats.org/presentationml/2006/main">
   <p:cSld>
@@ -5906,12 +5935,12 @@
       </p:grpSpPr>
       <p:sp>
         <p:nvSpPr>
-          <p:cNvPr id="3" name="Content Placeholder 2"/>
-          <p:cNvSpPr>
-            <a:spLocks noGrp="1"/>
-          </p:cNvSpPr>
-          <p:nvPr>
-            <p:ph idx="1"/>
+          <p:cNvPr id="2" name="Title 1"/>
+          <p:cNvSpPr>
+            <a:spLocks noGrp="1"/>
+          </p:cNvSpPr>
+          <p:nvPr>
+            <p:ph type="title"/>
           </p:nvPr>
         </p:nvSpPr>
         <p:spPr/>
@@ -5924,27 +5953,41 @@
             </a:pPr>
             <a:r>
               <a:rPr/>
-              <a:t>The preview shows you a rendered HTML copy of the contents of the editor. Consequently, unlike </a:t>
-            </a:r>
-            <a:r>
-              <a:rPr i="1"/>
-              <a:t>Knit</a:t>
-            </a:r>
-            <a:r>
-              <a:rPr/>
-              <a:t>, </a:t>
-            </a:r>
-            <a:r>
-              <a:rPr i="1"/>
-              <a:t>Preview</a:t>
-            </a:r>
-            <a:r>
-              <a:rPr/>
-              <a:t> does not run any R code chunks. Instead, the output of the chunk when it was last run in the editor is displayed.</a:t>
-            </a:r>
-          </a:p>
-        </p:txBody>
-      </p:sp>
+              <a:t>Test Code Chunk (4)</a:t>
+            </a:r>
+          </a:p>
+        </p:txBody>
+      </p:sp>
+      <p:pic>
+        <p:nvPicPr>
+          <p:cNvPr descr="Rmarkdown-J_files/figure-pptx/unnamed-chunk-6-1.png" id="0" name="Picture 1"/>
+          <p:cNvPicPr>
+            <a:picLocks noGrp="1" noChangeAspect="1"/>
+          </p:cNvPicPr>
+          <p:nvPr/>
+        </p:nvPicPr>
+        <p:blipFill>
+          <a:blip r:embed="rId2"/>
+          <a:stretch>
+            <a:fillRect/>
+          </a:stretch>
+        </p:blipFill>
+        <p:spPr bwMode="auto">
+          <a:xfrm>
+            <a:off x="2451100" y="1193800"/>
+            <a:ext cx="4241800" cy="3390900"/>
+          </a:xfrm>
+          <a:prstGeom prst="rect">
+            <a:avLst/>
+          </a:prstGeom>
+          <a:noFill/>
+          <a:ln w="9525">
+            <a:noFill/>
+            <a:headEnd/>
+            <a:tailEnd/>
+          </a:ln>
+        </p:spPr>
+      </p:pic>
     </p:spTree>
   </p:cSld>
 </p:sld>

</xml_diff>